<commit_message>
Update CV with latest info
</commit_message>
<xml_diff>
--- a/about_me.pptx
+++ b/about_me.pptx
@@ -197,7 +197,7 @@
           <a:p>
             <a:fld id="{15FE3CD1-B16D-4440-B736-5A5B00AE2421}" type="datetimeFigureOut">
               <a:rPr lang="en-US" smtClean="0"/>
-              <a:t>6/12/23</a:t>
+              <a:t>8/30/24</a:t>
             </a:fld>
             <a:endParaRPr lang="en-US"/>
           </a:p>
@@ -711,7 +711,7 @@
           <a:p>
             <a:fld id="{524C6359-9BB8-4148-8114-537E698DA205}" type="datetime1">
               <a:rPr lang="en-US" smtClean="0"/>
-              <a:t>6/12/23</a:t>
+              <a:t>8/30/24</a:t>
             </a:fld>
             <a:endParaRPr lang="en-US" dirty="0"/>
           </a:p>
@@ -1771,7 +1771,7 @@
           <a:p>
             <a:fld id="{A4649BD0-10DB-43E7-8F22-40B3D51B8FC3}" type="datetime1">
               <a:rPr lang="en-US" smtClean="0"/>
-              <a:t>6/12/23</a:t>
+              <a:t>8/30/24</a:t>
             </a:fld>
             <a:endParaRPr lang="en-US"/>
           </a:p>
@@ -2832,7 +2832,7 @@
           <a:p>
             <a:fld id="{0A16C79C-F566-427A-93F6-434A4E613134}" type="datetime1">
               <a:rPr lang="en-US" smtClean="0"/>
-              <a:t>6/12/23</a:t>
+              <a:t>8/30/24</a:t>
             </a:fld>
             <a:endParaRPr lang="en-US"/>
           </a:p>
@@ -3888,7 +3888,7 @@
           <a:p>
             <a:fld id="{9376191F-481E-48E9-BB9A-369A67A7362D}" type="datetime1">
               <a:rPr lang="en-US" smtClean="0"/>
-              <a:t>6/12/23</a:t>
+              <a:t>8/30/24</a:t>
             </a:fld>
             <a:endParaRPr lang="en-US" dirty="0"/>
           </a:p>
@@ -5017,7 +5017,7 @@
           <a:p>
             <a:fld id="{6C5677DE-DD04-48CC-9C18-7BE9FF2DEB6B}" type="datetime1">
               <a:rPr lang="en-US" smtClean="0"/>
-              <a:t>6/12/23</a:t>
+              <a:t>8/30/24</a:t>
             </a:fld>
             <a:endParaRPr lang="en-US"/>
           </a:p>
@@ -6136,7 +6136,7 @@
           <a:p>
             <a:fld id="{463255ED-7101-4D18-A8AE-3B5E4CB87EA5}" type="datetime1">
               <a:rPr lang="en-US" smtClean="0"/>
-              <a:t>6/12/23</a:t>
+              <a:t>8/30/24</a:t>
             </a:fld>
             <a:endParaRPr lang="en-US"/>
           </a:p>
@@ -7442,7 +7442,7 @@
           <a:p>
             <a:fld id="{CD52F23D-51F6-4C94-8CD5-B9ABBF67EE23}" type="datetime1">
               <a:rPr lang="en-US" smtClean="0"/>
-              <a:t>6/12/23</a:t>
+              <a:t>8/30/24</a:t>
             </a:fld>
             <a:endParaRPr lang="en-US"/>
           </a:p>
@@ -7589,7 +7589,7 @@
           <a:p>
             <a:fld id="{D51A702F-6367-4FD1-89A8-3744BE6BA9A2}" type="datetime1">
               <a:rPr lang="en-US" smtClean="0"/>
-              <a:t>6/12/23</a:t>
+              <a:t>8/30/24</a:t>
             </a:fld>
             <a:endParaRPr lang="en-US"/>
           </a:p>
@@ -8553,7 +8553,7 @@
           <a:p>
             <a:fld id="{4A6E99BD-4B4F-4460-B452-0E8146ACCF8F}" type="datetime1">
               <a:rPr lang="en-US" smtClean="0"/>
-              <a:t>6/12/23</a:t>
+              <a:t>8/30/24</a:t>
             </a:fld>
             <a:endParaRPr lang="en-US"/>
           </a:p>
@@ -8872,7 +8872,7 @@
           <a:p>
             <a:fld id="{EB6FD34C-1867-42A9-AC54-D15ADD8A65E7}" type="datetime1">
               <a:rPr lang="en-US" smtClean="0"/>
-              <a:t>6/12/23</a:t>
+              <a:t>8/30/24</a:t>
             </a:fld>
             <a:endParaRPr lang="en-US"/>
           </a:p>
@@ -10020,7 +10020,7 @@
           <a:p>
             <a:fld id="{336133E9-A654-4C17-8C3C-DDCAC83D6EBF}" type="datetime1">
               <a:rPr lang="en-US" smtClean="0"/>
-              <a:t>6/12/23</a:t>
+              <a:t>8/30/24</a:t>
             </a:fld>
             <a:endParaRPr lang="en-US"/>
           </a:p>
@@ -12430,7 +12430,7 @@
           <a:p>
             <a:fld id="{8769D389-4C4C-4FD7-9E6B-9F44477F0EB8}" type="datetime1">
               <a:rPr lang="en-US" smtClean="0"/>
-              <a:t>6/12/23</a:t>
+              <a:t>8/30/24</a:t>
             </a:fld>
             <a:endParaRPr lang="en-US" dirty="0"/>
           </a:p>
@@ -17688,7 +17688,7 @@
         <p:spPr bwMode="auto">
           <a:xfrm>
             <a:off x="1295407" y="4500731"/>
-            <a:ext cx="889470" cy="889470"/>
+            <a:ext cx="628129" cy="628129"/>
           </a:xfrm>
           <a:prstGeom prst="rect">
             <a:avLst/>
@@ -17734,8 +17734,8 @@
         </p:blipFill>
         <p:spPr bwMode="auto">
           <a:xfrm>
-            <a:off x="337052" y="5612775"/>
-            <a:ext cx="636561" cy="1037323"/>
+            <a:off x="368932" y="4440571"/>
+            <a:ext cx="449529" cy="732541"/>
           </a:xfrm>
           <a:prstGeom prst="rect">
             <a:avLst/>
@@ -17782,7 +17782,7 @@
         <p:spPr bwMode="auto">
           <a:xfrm>
             <a:off x="2308469" y="4549666"/>
-            <a:ext cx="787400" cy="787400"/>
+            <a:ext cx="556049" cy="556049"/>
           </a:xfrm>
           <a:prstGeom prst="rect">
             <a:avLst/>
@@ -17829,7 +17829,7 @@
         <p:spPr bwMode="auto">
           <a:xfrm>
             <a:off x="3380868" y="4527851"/>
-            <a:ext cx="787400" cy="787400"/>
+            <a:ext cx="556049" cy="556049"/>
           </a:xfrm>
           <a:prstGeom prst="rect">
             <a:avLst/>
@@ -17876,7 +17876,7 @@
         <p:spPr bwMode="auto">
           <a:xfrm>
             <a:off x="4407824" y="4544785"/>
-            <a:ext cx="753533" cy="753533"/>
+            <a:ext cx="532133" cy="532133"/>
           </a:xfrm>
           <a:prstGeom prst="rect">
             <a:avLst/>
@@ -17922,8 +17922,8 @@
         </p:blipFill>
         <p:spPr bwMode="auto">
           <a:xfrm>
-            <a:off x="1250075" y="5724756"/>
-            <a:ext cx="798235" cy="798235"/>
+            <a:off x="1250076" y="5724757"/>
+            <a:ext cx="563700" cy="563700"/>
           </a:xfrm>
           <a:prstGeom prst="rect">
             <a:avLst/>
@@ -17970,7 +17970,7 @@
         <p:spPr bwMode="auto">
           <a:xfrm>
             <a:off x="2387352" y="5729756"/>
-            <a:ext cx="798234" cy="798234"/>
+            <a:ext cx="563700" cy="563700"/>
           </a:xfrm>
           <a:prstGeom prst="rect">
             <a:avLst/>
@@ -18016,8 +18016,8 @@
         </p:blipFill>
         <p:spPr bwMode="auto">
           <a:xfrm>
-            <a:off x="3595846" y="5724757"/>
-            <a:ext cx="797679" cy="798234"/>
+            <a:off x="3595847" y="5724757"/>
+            <a:ext cx="563308" cy="563700"/>
           </a:xfrm>
           <a:prstGeom prst="rect">
             <a:avLst/>
@@ -18965,335 +18965,6 @@
           </a:extLst>
         </p:spPr>
       </p:pic>
-      <p:grpSp>
-        <p:nvGrpSpPr>
-          <p:cNvPr id="31" name="Group 30">
-            <a:extLst>
-              <a:ext uri="{FF2B5EF4-FFF2-40B4-BE49-F238E27FC236}">
-                <a16:creationId xmlns:a16="http://schemas.microsoft.com/office/drawing/2014/main" id="{F3C75100-0111-D1B6-1750-3DE2F0ABEA52}"/>
-              </a:ext>
-            </a:extLst>
-          </p:cNvPr>
-          <p:cNvGrpSpPr/>
-          <p:nvPr/>
-        </p:nvGrpSpPr>
-        <p:grpSpPr>
-          <a:xfrm>
-            <a:off x="6103184" y="4515817"/>
-            <a:ext cx="4196527" cy="1513398"/>
-            <a:chOff x="6374117" y="4515817"/>
-            <a:chExt cx="4196527" cy="1513398"/>
-          </a:xfrm>
-        </p:grpSpPr>
-        <p:pic>
-          <p:nvPicPr>
-            <p:cNvPr id="1046" name="Picture 22" descr="DRIFE TECHNOLOGIES PRIVATE LIMITED - Crunchbase Company Profile &amp; Funding">
-              <a:extLst>
-                <a:ext uri="{FF2B5EF4-FFF2-40B4-BE49-F238E27FC236}">
-                  <a16:creationId xmlns:a16="http://schemas.microsoft.com/office/drawing/2014/main" id="{F42A9860-6FF9-BE5E-DDED-B7206A35D7C1}"/>
-                </a:ext>
-              </a:extLst>
-            </p:cNvPr>
-            <p:cNvPicPr>
-              <a:picLocks noChangeAspect="1" noChangeArrowheads="1"/>
-            </p:cNvPicPr>
-            <p:nvPr/>
-          </p:nvPicPr>
-          <p:blipFill>
-            <a:blip r:embed="rId24">
-              <a:extLst>
-                <a:ext uri="{28A0092B-C50C-407E-A947-70E740481C1C}">
-                  <a14:useLocalDpi xmlns:a14="http://schemas.microsoft.com/office/drawing/2010/main" val="0"/>
-                </a:ext>
-              </a:extLst>
-            </a:blip>
-            <a:srcRect/>
-            <a:stretch>
-              <a:fillRect/>
-            </a:stretch>
-          </p:blipFill>
-          <p:spPr bwMode="auto">
-            <a:xfrm>
-              <a:off x="6374117" y="4515817"/>
-              <a:ext cx="983580" cy="855976"/>
-            </a:xfrm>
-            <a:prstGeom prst="rect">
-              <a:avLst/>
-            </a:prstGeom>
-            <a:noFill/>
-            <a:extLst>
-              <a:ext uri="{909E8E84-426E-40DD-AFC4-6F175D3DCCD1}">
-                <a14:hiddenFill xmlns:a14="http://schemas.microsoft.com/office/drawing/2010/main">
-                  <a:solidFill>
-                    <a:srgbClr val="FFFFFF"/>
-                  </a:solidFill>
-                </a14:hiddenFill>
-              </a:ext>
-            </a:extLst>
-          </p:spPr>
-        </p:pic>
-        <p:pic>
-          <p:nvPicPr>
-            <p:cNvPr id="1048" name="Picture 24" descr="Boot Finance (@bootfinance) / Twitter">
-              <a:extLst>
-                <a:ext uri="{FF2B5EF4-FFF2-40B4-BE49-F238E27FC236}">
-                  <a16:creationId xmlns:a16="http://schemas.microsoft.com/office/drawing/2014/main" id="{B22AA95D-59DA-98B3-8ED9-A97FA7FCD5DF}"/>
-                </a:ext>
-              </a:extLst>
-            </p:cNvPr>
-            <p:cNvPicPr>
-              <a:picLocks noChangeAspect="1" noChangeArrowheads="1"/>
-            </p:cNvPicPr>
-            <p:nvPr/>
-          </p:nvPicPr>
-          <p:blipFill>
-            <a:blip r:embed="rId25">
-              <a:extLst>
-                <a:ext uri="{28A0092B-C50C-407E-A947-70E740481C1C}">
-                  <a14:useLocalDpi xmlns:a14="http://schemas.microsoft.com/office/drawing/2010/main" val="0"/>
-                </a:ext>
-              </a:extLst>
-            </a:blip>
-            <a:srcRect/>
-            <a:stretch>
-              <a:fillRect/>
-            </a:stretch>
-          </p:blipFill>
-          <p:spPr bwMode="auto">
-            <a:xfrm>
-              <a:off x="7621795" y="4545883"/>
-              <a:ext cx="657960" cy="657960"/>
-            </a:xfrm>
-            <a:prstGeom prst="rect">
-              <a:avLst/>
-            </a:prstGeom>
-            <a:noFill/>
-            <a:extLst>
-              <a:ext uri="{909E8E84-426E-40DD-AFC4-6F175D3DCCD1}">
-                <a14:hiddenFill xmlns:a14="http://schemas.microsoft.com/office/drawing/2010/main">
-                  <a:solidFill>
-                    <a:srgbClr val="FFFFFF"/>
-                  </a:solidFill>
-                </a14:hiddenFill>
-              </a:ext>
-            </a:extLst>
-          </p:spPr>
-        </p:pic>
-        <p:pic>
-          <p:nvPicPr>
-            <p:cNvPr id="1050" name="Picture 26" descr="Master Ventures">
-              <a:extLst>
-                <a:ext uri="{FF2B5EF4-FFF2-40B4-BE49-F238E27FC236}">
-                  <a16:creationId xmlns:a16="http://schemas.microsoft.com/office/drawing/2014/main" id="{9F499E73-EB81-A608-5652-D7A5D3F40366}"/>
-                </a:ext>
-              </a:extLst>
-            </p:cNvPr>
-            <p:cNvPicPr>
-              <a:picLocks noChangeAspect="1" noChangeArrowheads="1"/>
-            </p:cNvPicPr>
-            <p:nvPr/>
-          </p:nvPicPr>
-          <p:blipFill>
-            <a:blip r:embed="rId26">
-              <a:extLst>
-                <a:ext uri="{28A0092B-C50C-407E-A947-70E740481C1C}">
-                  <a14:useLocalDpi xmlns:a14="http://schemas.microsoft.com/office/drawing/2010/main" val="0"/>
-                </a:ext>
-              </a:extLst>
-            </a:blip>
-            <a:srcRect/>
-            <a:stretch>
-              <a:fillRect/>
-            </a:stretch>
-          </p:blipFill>
-          <p:spPr bwMode="auto">
-            <a:xfrm>
-              <a:off x="9642906" y="4517094"/>
-              <a:ext cx="416840" cy="745651"/>
-            </a:xfrm>
-            <a:prstGeom prst="rect">
-              <a:avLst/>
-            </a:prstGeom>
-            <a:noFill/>
-            <a:extLst>
-              <a:ext uri="{909E8E84-426E-40DD-AFC4-6F175D3DCCD1}">
-                <a14:hiddenFill xmlns:a14="http://schemas.microsoft.com/office/drawing/2010/main">
-                  <a:solidFill>
-                    <a:srgbClr val="FFFFFF"/>
-                  </a:solidFill>
-                </a14:hiddenFill>
-              </a:ext>
-            </a:extLst>
-          </p:spPr>
-        </p:pic>
-        <p:pic>
-          <p:nvPicPr>
-            <p:cNvPr id="1054" name="Picture 30" descr="Image">
-              <a:extLst>
-                <a:ext uri="{FF2B5EF4-FFF2-40B4-BE49-F238E27FC236}">
-                  <a16:creationId xmlns:a16="http://schemas.microsoft.com/office/drawing/2014/main" id="{144B74DF-894A-53A2-9BE0-4AAD8ACA2F9A}"/>
-                </a:ext>
-              </a:extLst>
-            </p:cNvPr>
-            <p:cNvPicPr>
-              <a:picLocks noChangeAspect="1" noChangeArrowheads="1"/>
-            </p:cNvPicPr>
-            <p:nvPr/>
-          </p:nvPicPr>
-          <p:blipFill>
-            <a:blip r:embed="rId27">
-              <a:extLst>
-                <a:ext uri="{28A0092B-C50C-407E-A947-70E740481C1C}">
-                  <a14:useLocalDpi xmlns:a14="http://schemas.microsoft.com/office/drawing/2010/main" val="0"/>
-                </a:ext>
-              </a:extLst>
-            </a:blip>
-            <a:srcRect/>
-            <a:stretch>
-              <a:fillRect/>
-            </a:stretch>
-          </p:blipFill>
-          <p:spPr bwMode="auto">
-            <a:xfrm>
-              <a:off x="8014441" y="5331358"/>
-              <a:ext cx="697857" cy="697857"/>
-            </a:xfrm>
-            <a:prstGeom prst="rect">
-              <a:avLst/>
-            </a:prstGeom>
-            <a:noFill/>
-            <a:extLst>
-              <a:ext uri="{909E8E84-426E-40DD-AFC4-6F175D3DCCD1}">
-                <a14:hiddenFill xmlns:a14="http://schemas.microsoft.com/office/drawing/2010/main">
-                  <a:solidFill>
-                    <a:srgbClr val="FFFFFF"/>
-                  </a:solidFill>
-                </a14:hiddenFill>
-              </a:ext>
-            </a:extLst>
-          </p:spPr>
-        </p:pic>
-        <p:pic>
-          <p:nvPicPr>
-            <p:cNvPr id="10" name="Picture 9">
-              <a:extLst>
-                <a:ext uri="{FF2B5EF4-FFF2-40B4-BE49-F238E27FC236}">
-                  <a16:creationId xmlns:a16="http://schemas.microsoft.com/office/drawing/2014/main" id="{A8063DA8-3B24-EABC-3023-20D5D3B9047F}"/>
-                </a:ext>
-              </a:extLst>
-            </p:cNvPr>
-            <p:cNvPicPr>
-              <a:picLocks noChangeAspect="1"/>
-            </p:cNvPicPr>
-            <p:nvPr/>
-          </p:nvPicPr>
-          <p:blipFill>
-            <a:blip r:embed="rId28"/>
-            <a:stretch>
-              <a:fillRect/>
-            </a:stretch>
-          </p:blipFill>
-          <p:spPr>
-            <a:xfrm>
-              <a:off x="8832908" y="5353078"/>
-              <a:ext cx="635123" cy="669061"/>
-            </a:xfrm>
-            <a:prstGeom prst="rect">
-              <a:avLst/>
-            </a:prstGeom>
-          </p:spPr>
-        </p:pic>
-        <p:pic>
-          <p:nvPicPr>
-            <p:cNvPr id="59" name="Picture 58">
-              <a:extLst>
-                <a:ext uri="{FF2B5EF4-FFF2-40B4-BE49-F238E27FC236}">
-                  <a16:creationId xmlns:a16="http://schemas.microsoft.com/office/drawing/2014/main" id="{D9E75864-99A1-925C-494F-A86AE4690CCF}"/>
-                </a:ext>
-              </a:extLst>
-            </p:cNvPr>
-            <p:cNvPicPr>
-              <a:picLocks noChangeAspect="1"/>
-            </p:cNvPicPr>
-            <p:nvPr/>
-          </p:nvPicPr>
-          <p:blipFill>
-            <a:blip r:embed="rId29"/>
-            <a:stretch>
-              <a:fillRect/>
-            </a:stretch>
-          </p:blipFill>
-          <p:spPr>
-            <a:xfrm>
-              <a:off x="8401919" y="4663935"/>
-              <a:ext cx="1105944" cy="421855"/>
-            </a:xfrm>
-            <a:prstGeom prst="rect">
-              <a:avLst/>
-            </a:prstGeom>
-          </p:spPr>
-        </p:pic>
-        <p:pic>
-          <p:nvPicPr>
-            <p:cNvPr id="3" name="Picture 2">
-              <a:extLst>
-                <a:ext uri="{FF2B5EF4-FFF2-40B4-BE49-F238E27FC236}">
-                  <a16:creationId xmlns:a16="http://schemas.microsoft.com/office/drawing/2014/main" id="{561B3082-3A82-E491-AC71-6114C788A4A7}"/>
-                </a:ext>
-              </a:extLst>
-            </p:cNvPr>
-            <p:cNvPicPr>
-              <a:picLocks noChangeAspect="1"/>
-            </p:cNvPicPr>
-            <p:nvPr/>
-          </p:nvPicPr>
-          <p:blipFill>
-            <a:blip r:embed="rId30"/>
-            <a:stretch>
-              <a:fillRect/>
-            </a:stretch>
-          </p:blipFill>
-          <p:spPr>
-            <a:xfrm>
-              <a:off x="6388662" y="5485909"/>
-              <a:ext cx="1337742" cy="468636"/>
-            </a:xfrm>
-            <a:prstGeom prst="rect">
-              <a:avLst/>
-            </a:prstGeom>
-          </p:spPr>
-        </p:pic>
-        <p:pic>
-          <p:nvPicPr>
-            <p:cNvPr id="19" name="Picture 18">
-              <a:extLst>
-                <a:ext uri="{FF2B5EF4-FFF2-40B4-BE49-F238E27FC236}">
-                  <a16:creationId xmlns:a16="http://schemas.microsoft.com/office/drawing/2014/main" id="{A090248F-46E0-5DD0-C5C7-D8F8F39C36A4}"/>
-                </a:ext>
-              </a:extLst>
-            </p:cNvPr>
-            <p:cNvPicPr>
-              <a:picLocks noChangeAspect="1"/>
-            </p:cNvPicPr>
-            <p:nvPr/>
-          </p:nvPicPr>
-          <p:blipFill>
-            <a:blip r:embed="rId31"/>
-            <a:stretch>
-              <a:fillRect/>
-            </a:stretch>
-          </p:blipFill>
-          <p:spPr>
-            <a:xfrm>
-              <a:off x="9544364" y="5444037"/>
-              <a:ext cx="1026280" cy="363474"/>
-            </a:xfrm>
-            <a:prstGeom prst="rect">
-              <a:avLst/>
-            </a:prstGeom>
-          </p:spPr>
-        </p:pic>
-      </p:grpSp>
       <p:pic>
         <p:nvPicPr>
           <p:cNvPr id="29" name="Picture 4" descr="Polkadot (DOT): Price Forecast - Monday Investor">
@@ -19309,7 +18980,7 @@
           <p:nvPr/>
         </p:nvPicPr>
         <p:blipFill>
-          <a:blip r:embed="rId32">
+          <a:blip r:embed="rId24">
             <a:extLst>
               <a:ext uri="{28A0092B-C50C-407E-A947-70E740481C1C}">
                 <a14:useLocalDpi xmlns:a14="http://schemas.microsoft.com/office/drawing/2010/main" val="0"/>
@@ -19323,8 +18994,8 @@
         </p:blipFill>
         <p:spPr bwMode="auto">
           <a:xfrm>
-            <a:off x="377419" y="4608191"/>
-            <a:ext cx="789601" cy="789601"/>
+            <a:off x="306604" y="5706779"/>
+            <a:ext cx="557603" cy="557603"/>
           </a:xfrm>
           <a:prstGeom prst="rect">
             <a:avLst/>
@@ -19356,7 +19027,7 @@
           <p:nvPr/>
         </p:nvPicPr>
         <p:blipFill>
-          <a:blip r:embed="rId33">
+          <a:blip r:embed="rId25">
             <a:extLst>
               <a:ext uri="{28A0092B-C50C-407E-A947-70E740481C1C}">
                 <a14:useLocalDpi xmlns:a14="http://schemas.microsoft.com/office/drawing/2010/main" val="0"/>
@@ -19371,7 +19042,7 @@
         <p:spPr bwMode="auto">
           <a:xfrm>
             <a:off x="4560600" y="5680507"/>
-            <a:ext cx="866354" cy="866354"/>
+            <a:ext cx="611805" cy="611805"/>
           </a:xfrm>
           <a:prstGeom prst="rect">
             <a:avLst/>
@@ -19446,7 +19117,7 @@
           <p:nvPr/>
         </p:nvPicPr>
         <p:blipFill>
-          <a:blip r:embed="rId34"/>
+          <a:blip r:embed="rId26"/>
           <a:stretch>
             <a:fillRect/>
           </a:stretch>
@@ -19461,6 +19132,449 @@
           </a:prstGeom>
         </p:spPr>
       </p:pic>
+      <p:grpSp>
+        <p:nvGrpSpPr>
+          <p:cNvPr id="21" name="Group 20">
+            <a:extLst>
+              <a:ext uri="{FF2B5EF4-FFF2-40B4-BE49-F238E27FC236}">
+                <a16:creationId xmlns:a16="http://schemas.microsoft.com/office/drawing/2014/main" id="{05985F5E-A113-D014-2612-14A938816D82}"/>
+              </a:ext>
+            </a:extLst>
+          </p:cNvPr>
+          <p:cNvGrpSpPr/>
+          <p:nvPr/>
+        </p:nvGrpSpPr>
+        <p:grpSpPr>
+          <a:xfrm>
+            <a:off x="6065073" y="4404418"/>
+            <a:ext cx="3914598" cy="1627891"/>
+            <a:chOff x="5959193" y="4161678"/>
+            <a:chExt cx="3914598" cy="1627891"/>
+          </a:xfrm>
+        </p:grpSpPr>
+        <p:pic>
+          <p:nvPicPr>
+            <p:cNvPr id="1046" name="Picture 22" descr="DRIFE TECHNOLOGIES PRIVATE LIMITED - Crunchbase Company Profile &amp; Funding">
+              <a:extLst>
+                <a:ext uri="{FF2B5EF4-FFF2-40B4-BE49-F238E27FC236}">
+                  <a16:creationId xmlns:a16="http://schemas.microsoft.com/office/drawing/2014/main" id="{F42A9860-6FF9-BE5E-DDED-B7206A35D7C1}"/>
+                </a:ext>
+              </a:extLst>
+            </p:cNvPr>
+            <p:cNvPicPr>
+              <a:picLocks noChangeAspect="1" noChangeArrowheads="1"/>
+            </p:cNvPicPr>
+            <p:nvPr/>
+          </p:nvPicPr>
+          <p:blipFill>
+            <a:blip r:embed="rId27">
+              <a:extLst>
+                <a:ext uri="{28A0092B-C50C-407E-A947-70E740481C1C}">
+                  <a14:useLocalDpi xmlns:a14="http://schemas.microsoft.com/office/drawing/2010/main" val="0"/>
+                </a:ext>
+              </a:extLst>
+            </a:blip>
+            <a:srcRect/>
+            <a:stretch>
+              <a:fillRect/>
+            </a:stretch>
+          </p:blipFill>
+          <p:spPr bwMode="auto">
+            <a:xfrm>
+              <a:off x="9209985" y="4189178"/>
+              <a:ext cx="606807" cy="528083"/>
+            </a:xfrm>
+            <a:prstGeom prst="rect">
+              <a:avLst/>
+            </a:prstGeom>
+            <a:noFill/>
+            <a:extLst>
+              <a:ext uri="{909E8E84-426E-40DD-AFC4-6F175D3DCCD1}">
+                <a14:hiddenFill xmlns:a14="http://schemas.microsoft.com/office/drawing/2010/main">
+                  <a:solidFill>
+                    <a:srgbClr val="FFFFFF"/>
+                  </a:solidFill>
+                </a14:hiddenFill>
+              </a:ext>
+            </a:extLst>
+          </p:spPr>
+        </p:pic>
+        <p:pic>
+          <p:nvPicPr>
+            <p:cNvPr id="1048" name="Picture 24" descr="Boot Finance (@bootfinance) / Twitter">
+              <a:extLst>
+                <a:ext uri="{FF2B5EF4-FFF2-40B4-BE49-F238E27FC236}">
+                  <a16:creationId xmlns:a16="http://schemas.microsoft.com/office/drawing/2014/main" id="{B22AA95D-59DA-98B3-8ED9-A97FA7FCD5DF}"/>
+                </a:ext>
+              </a:extLst>
+            </p:cNvPr>
+            <p:cNvPicPr>
+              <a:picLocks noChangeAspect="1" noChangeArrowheads="1"/>
+            </p:cNvPicPr>
+            <p:nvPr/>
+          </p:nvPicPr>
+          <p:blipFill>
+            <a:blip r:embed="rId28">
+              <a:extLst>
+                <a:ext uri="{28A0092B-C50C-407E-A947-70E740481C1C}">
+                  <a14:useLocalDpi xmlns:a14="http://schemas.microsoft.com/office/drawing/2010/main" val="0"/>
+                </a:ext>
+              </a:extLst>
+            </a:blip>
+            <a:srcRect/>
+            <a:stretch>
+              <a:fillRect/>
+            </a:stretch>
+          </p:blipFill>
+          <p:spPr bwMode="auto">
+            <a:xfrm>
+              <a:off x="5959193" y="5002378"/>
+              <a:ext cx="657960" cy="657960"/>
+            </a:xfrm>
+            <a:prstGeom prst="rect">
+              <a:avLst/>
+            </a:prstGeom>
+            <a:noFill/>
+            <a:extLst>
+              <a:ext uri="{909E8E84-426E-40DD-AFC4-6F175D3DCCD1}">
+                <a14:hiddenFill xmlns:a14="http://schemas.microsoft.com/office/drawing/2010/main">
+                  <a:solidFill>
+                    <a:srgbClr val="FFFFFF"/>
+                  </a:solidFill>
+                </a14:hiddenFill>
+              </a:ext>
+            </a:extLst>
+          </p:spPr>
+        </p:pic>
+        <p:pic>
+          <p:nvPicPr>
+            <p:cNvPr id="1050" name="Picture 26" descr="Master Ventures">
+              <a:extLst>
+                <a:ext uri="{FF2B5EF4-FFF2-40B4-BE49-F238E27FC236}">
+                  <a16:creationId xmlns:a16="http://schemas.microsoft.com/office/drawing/2014/main" id="{9F499E73-EB81-A608-5652-D7A5D3F40366}"/>
+                </a:ext>
+              </a:extLst>
+            </p:cNvPr>
+            <p:cNvPicPr>
+              <a:picLocks noChangeAspect="1" noChangeArrowheads="1"/>
+            </p:cNvPicPr>
+            <p:nvPr/>
+          </p:nvPicPr>
+          <p:blipFill>
+            <a:blip r:embed="rId29">
+              <a:extLst>
+                <a:ext uri="{28A0092B-C50C-407E-A947-70E740481C1C}">
+                  <a14:useLocalDpi xmlns:a14="http://schemas.microsoft.com/office/drawing/2010/main" val="0"/>
+                </a:ext>
+              </a:extLst>
+            </a:blip>
+            <a:srcRect/>
+            <a:stretch>
+              <a:fillRect/>
+            </a:stretch>
+          </p:blipFill>
+          <p:spPr bwMode="auto">
+            <a:xfrm>
+              <a:off x="7532304" y="4161678"/>
+              <a:ext cx="416840" cy="745651"/>
+            </a:xfrm>
+            <a:prstGeom prst="rect">
+              <a:avLst/>
+            </a:prstGeom>
+            <a:noFill/>
+            <a:extLst>
+              <a:ext uri="{909E8E84-426E-40DD-AFC4-6F175D3DCCD1}">
+                <a14:hiddenFill xmlns:a14="http://schemas.microsoft.com/office/drawing/2010/main">
+                  <a:solidFill>
+                    <a:srgbClr val="FFFFFF"/>
+                  </a:solidFill>
+                </a14:hiddenFill>
+              </a:ext>
+            </a:extLst>
+          </p:spPr>
+        </p:pic>
+        <p:pic>
+          <p:nvPicPr>
+            <p:cNvPr id="1054" name="Picture 30" descr="Image">
+              <a:extLst>
+                <a:ext uri="{FF2B5EF4-FFF2-40B4-BE49-F238E27FC236}">
+                  <a16:creationId xmlns:a16="http://schemas.microsoft.com/office/drawing/2014/main" id="{144B74DF-894A-53A2-9BE0-4AAD8ACA2F9A}"/>
+                </a:ext>
+              </a:extLst>
+            </p:cNvPr>
+            <p:cNvPicPr>
+              <a:picLocks noChangeAspect="1" noChangeArrowheads="1"/>
+            </p:cNvPicPr>
+            <p:nvPr/>
+          </p:nvPicPr>
+          <p:blipFill>
+            <a:blip r:embed="rId30">
+              <a:extLst>
+                <a:ext uri="{28A0092B-C50C-407E-A947-70E740481C1C}">
+                  <a14:useLocalDpi xmlns:a14="http://schemas.microsoft.com/office/drawing/2010/main" val="0"/>
+                </a:ext>
+              </a:extLst>
+            </a:blip>
+            <a:srcRect/>
+            <a:stretch>
+              <a:fillRect/>
+            </a:stretch>
+          </p:blipFill>
+          <p:spPr bwMode="auto">
+            <a:xfrm>
+              <a:off x="8194041" y="5091712"/>
+              <a:ext cx="697857" cy="697857"/>
+            </a:xfrm>
+            <a:prstGeom prst="rect">
+              <a:avLst/>
+            </a:prstGeom>
+            <a:noFill/>
+            <a:extLst>
+              <a:ext uri="{909E8E84-426E-40DD-AFC4-6F175D3DCCD1}">
+                <a14:hiddenFill xmlns:a14="http://schemas.microsoft.com/office/drawing/2010/main">
+                  <a:solidFill>
+                    <a:srgbClr val="FFFFFF"/>
+                  </a:solidFill>
+                </a14:hiddenFill>
+              </a:ext>
+            </a:extLst>
+          </p:spPr>
+        </p:pic>
+        <p:pic>
+          <p:nvPicPr>
+            <p:cNvPr id="10" name="Picture 9">
+              <a:extLst>
+                <a:ext uri="{FF2B5EF4-FFF2-40B4-BE49-F238E27FC236}">
+                  <a16:creationId xmlns:a16="http://schemas.microsoft.com/office/drawing/2014/main" id="{A8063DA8-3B24-EABC-3023-20D5D3B9047F}"/>
+                </a:ext>
+              </a:extLst>
+            </p:cNvPr>
+            <p:cNvPicPr>
+              <a:picLocks noChangeAspect="1"/>
+            </p:cNvPicPr>
+            <p:nvPr/>
+          </p:nvPicPr>
+          <p:blipFill>
+            <a:blip r:embed="rId31"/>
+            <a:stretch>
+              <a:fillRect/>
+            </a:stretch>
+          </p:blipFill>
+          <p:spPr>
+            <a:xfrm>
+              <a:off x="9238668" y="4760417"/>
+              <a:ext cx="635123" cy="669061"/>
+            </a:xfrm>
+            <a:prstGeom prst="rect">
+              <a:avLst/>
+            </a:prstGeom>
+          </p:spPr>
+        </p:pic>
+        <p:pic>
+          <p:nvPicPr>
+            <p:cNvPr id="59" name="Picture 58">
+              <a:extLst>
+                <a:ext uri="{FF2B5EF4-FFF2-40B4-BE49-F238E27FC236}">
+                  <a16:creationId xmlns:a16="http://schemas.microsoft.com/office/drawing/2014/main" id="{D9E75864-99A1-925C-494F-A86AE4690CCF}"/>
+                </a:ext>
+              </a:extLst>
+            </p:cNvPr>
+            <p:cNvPicPr>
+              <a:picLocks noChangeAspect="1"/>
+            </p:cNvPicPr>
+            <p:nvPr/>
+          </p:nvPicPr>
+          <p:blipFill>
+            <a:blip r:embed="rId32"/>
+            <a:stretch>
+              <a:fillRect/>
+            </a:stretch>
+          </p:blipFill>
+          <p:spPr>
+            <a:xfrm>
+              <a:off x="8030293" y="4186336"/>
+              <a:ext cx="1105944" cy="421855"/>
+            </a:xfrm>
+            <a:prstGeom prst="rect">
+              <a:avLst/>
+            </a:prstGeom>
+          </p:spPr>
+        </p:pic>
+        <p:pic>
+          <p:nvPicPr>
+            <p:cNvPr id="3" name="Picture 2">
+              <a:extLst>
+                <a:ext uri="{FF2B5EF4-FFF2-40B4-BE49-F238E27FC236}">
+                  <a16:creationId xmlns:a16="http://schemas.microsoft.com/office/drawing/2014/main" id="{561B3082-3A82-E491-AC71-6114C788A4A7}"/>
+                </a:ext>
+              </a:extLst>
+            </p:cNvPr>
+            <p:cNvPicPr>
+              <a:picLocks noChangeAspect="1"/>
+            </p:cNvPicPr>
+            <p:nvPr/>
+          </p:nvPicPr>
+          <p:blipFill>
+            <a:blip r:embed="rId33"/>
+            <a:stretch>
+              <a:fillRect/>
+            </a:stretch>
+          </p:blipFill>
+          <p:spPr>
+            <a:xfrm>
+              <a:off x="6674665" y="5055956"/>
+              <a:ext cx="1337742" cy="468636"/>
+            </a:xfrm>
+            <a:prstGeom prst="rect">
+              <a:avLst/>
+            </a:prstGeom>
+          </p:spPr>
+        </p:pic>
+        <p:pic>
+          <p:nvPicPr>
+            <p:cNvPr id="19" name="Picture 18">
+              <a:extLst>
+                <a:ext uri="{FF2B5EF4-FFF2-40B4-BE49-F238E27FC236}">
+                  <a16:creationId xmlns:a16="http://schemas.microsoft.com/office/drawing/2014/main" id="{A090248F-46E0-5DD0-C5C7-D8F8F39C36A4}"/>
+                </a:ext>
+              </a:extLst>
+            </p:cNvPr>
+            <p:cNvPicPr>
+              <a:picLocks noChangeAspect="1"/>
+            </p:cNvPicPr>
+            <p:nvPr/>
+          </p:nvPicPr>
+          <p:blipFill>
+            <a:blip r:embed="rId34"/>
+            <a:stretch>
+              <a:fillRect/>
+            </a:stretch>
+          </p:blipFill>
+          <p:spPr>
+            <a:xfrm>
+              <a:off x="8080766" y="4682859"/>
+              <a:ext cx="1026280" cy="363474"/>
+            </a:xfrm>
+            <a:prstGeom prst="rect">
+              <a:avLst/>
+            </a:prstGeom>
+          </p:spPr>
+        </p:pic>
+        <p:pic>
+          <p:nvPicPr>
+            <p:cNvPr id="4" name="Picture 3">
+              <a:extLst>
+                <a:ext uri="{FF2B5EF4-FFF2-40B4-BE49-F238E27FC236}">
+                  <a16:creationId xmlns:a16="http://schemas.microsoft.com/office/drawing/2014/main" id="{4E0B731B-F0B5-DF76-D929-9FB91BA40E29}"/>
+                </a:ext>
+              </a:extLst>
+            </p:cNvPr>
+            <p:cNvPicPr>
+              <a:picLocks noChangeAspect="1"/>
+            </p:cNvPicPr>
+            <p:nvPr/>
+          </p:nvPicPr>
+          <p:blipFill>
+            <a:blip r:embed="rId35"/>
+            <a:stretch>
+              <a:fillRect/>
+            </a:stretch>
+          </p:blipFill>
+          <p:spPr>
+            <a:xfrm>
+              <a:off x="5973367" y="4162310"/>
+              <a:ext cx="1473199" cy="397708"/>
+            </a:xfrm>
+            <a:prstGeom prst="rect">
+              <a:avLst/>
+            </a:prstGeom>
+          </p:spPr>
+        </p:pic>
+        <p:pic>
+          <p:nvPicPr>
+            <p:cNvPr id="6" name="Picture 5">
+              <a:extLst>
+                <a:ext uri="{FF2B5EF4-FFF2-40B4-BE49-F238E27FC236}">
+                  <a16:creationId xmlns:a16="http://schemas.microsoft.com/office/drawing/2014/main" id="{E5A60497-C6D0-953F-F293-BCF213728536}"/>
+                </a:ext>
+              </a:extLst>
+            </p:cNvPr>
+            <p:cNvPicPr>
+              <a:picLocks noChangeAspect="1"/>
+            </p:cNvPicPr>
+            <p:nvPr/>
+          </p:nvPicPr>
+          <p:blipFill>
+            <a:blip r:embed="rId36"/>
+            <a:stretch>
+              <a:fillRect/>
+            </a:stretch>
+          </p:blipFill>
+          <p:spPr>
+            <a:xfrm>
+              <a:off x="5964865" y="4615229"/>
+              <a:ext cx="1486290" cy="350612"/>
+            </a:xfrm>
+            <a:prstGeom prst="rect">
+              <a:avLst/>
+            </a:prstGeom>
+          </p:spPr>
+        </p:pic>
+        <p:sp>
+          <p:nvSpPr>
+            <p:cNvPr id="7" name="TextBox 6">
+              <a:extLst>
+                <a:ext uri="{FF2B5EF4-FFF2-40B4-BE49-F238E27FC236}">
+                  <a16:creationId xmlns:a16="http://schemas.microsoft.com/office/drawing/2014/main" id="{D621C5D9-C0B5-12CC-8079-491D60E539E7}"/>
+                </a:ext>
+              </a:extLst>
+            </p:cNvPr>
+            <p:cNvSpPr txBox="1"/>
+            <p:nvPr/>
+          </p:nvSpPr>
+          <p:spPr>
+            <a:xfrm>
+              <a:off x="9289332" y="5264045"/>
+              <a:ext cx="569387" cy="230832"/>
+            </a:xfrm>
+            <a:prstGeom prst="rect">
+              <a:avLst/>
+            </a:prstGeom>
+            <a:noFill/>
+          </p:spPr>
+          <p:txBody>
+            <a:bodyPr wrap="none" rtlCol="0">
+              <a:spAutoFit/>
+            </a:bodyPr>
+            <a:lstStyle/>
+            <a:p>
+              <a:r>
+                <a:rPr lang="en-US" sz="900" b="1" dirty="0">
+                  <a:solidFill>
+                    <a:schemeClr val="tx1">
+                      <a:lumMod val="50000"/>
+                      <a:lumOff val="50000"/>
+                    </a:schemeClr>
+                  </a:solidFill>
+                  <a:latin typeface="Arial" panose="020B0604020202020204" pitchFamily="34" charset="0"/>
+                  <a:cs typeface="Arial" panose="020B0604020202020204" pitchFamily="34" charset="0"/>
+                </a:rPr>
+                <a:t>Upside</a:t>
+              </a:r>
+              <a:endParaRPr lang="en-US" b="1" dirty="0">
+                <a:solidFill>
+                  <a:schemeClr val="tx1">
+                    <a:lumMod val="50000"/>
+                    <a:lumOff val="50000"/>
+                  </a:schemeClr>
+                </a:solidFill>
+                <a:latin typeface="Arial" panose="020B0604020202020204" pitchFamily="34" charset="0"/>
+                <a:cs typeface="Arial" panose="020B0604020202020204" pitchFamily="34" charset="0"/>
+              </a:endParaRPr>
+            </a:p>
+          </p:txBody>
+        </p:sp>
+      </p:grpSp>
     </p:spTree>
     <p:extLst>
       <p:ext uri="{BB962C8B-B14F-4D97-AF65-F5344CB8AC3E}">

</xml_diff>